<commit_message>
added schema and presentation
</commit_message>
<xml_diff>
--- a/Presentation.pptx
+++ b/Presentation.pptx
@@ -6352,7 +6352,7 @@
       </p:sp>
       <p:pic>
         <p:nvPicPr>
-          <p:cNvPr id="10" name="Picture 9"/>
+          <p:cNvPr id="3" name="Picture 2"/>
           <p:cNvPicPr>
             <a:picLocks noChangeAspect="1"/>
           </p:cNvPicPr>
@@ -6372,7 +6372,7 @@
         </p:blipFill>
         <p:spPr>
           <a:xfrm>
-            <a:off x="1662205" y="1166769"/>
+            <a:off x="1662205" y="1174861"/>
             <a:ext cx="9662922" cy="3072384"/>
           </a:xfrm>
           <a:prstGeom prst="rect">
@@ -6473,6 +6473,13 @@
   <p:clrMapOvr>
     <a:masterClrMapping/>
   </p:clrMapOvr>
+  <p:timing>
+    <p:tnLst>
+      <p:par>
+        <p:cTn id="1" dur="indefinite" restart="never" nodeType="tmRoot"/>
+      </p:par>
+    </p:tnLst>
+  </p:timing>
 </p:sld>
 </file>
 
@@ -6545,6 +6552,13 @@
   <p:clrMapOvr>
     <a:masterClrMapping/>
   </p:clrMapOvr>
+  <p:timing>
+    <p:tnLst>
+      <p:par>
+        <p:cTn id="1" dur="indefinite" restart="never" nodeType="tmRoot"/>
+      </p:par>
+    </p:tnLst>
+  </p:timing>
 </p:sld>
 </file>
 

</xml_diff>